<commit_message>
add files, ensure notebook works
</commit_message>
<xml_diff>
--- a/Presentation.pptx
+++ b/Presentation.pptx
@@ -5102,10 +5102,10 @@
       </p:sp>
       <p:pic>
         <p:nvPicPr>
-          <p:cNvPr id="10" name="Picture 9">
-            <a:extLst>
-              <a:ext uri="{FF2B5EF4-FFF2-40B4-BE49-F238E27FC236}">
-                <a16:creationId xmlns:a16="http://schemas.microsoft.com/office/drawing/2014/main" id="{F7A41C44-B420-E94E-7421-FE117AA04D99}"/>
+          <p:cNvPr id="12" name="Picture 11">
+            <a:extLst>
+              <a:ext uri="{FF2B5EF4-FFF2-40B4-BE49-F238E27FC236}">
+                <a16:creationId xmlns:a16="http://schemas.microsoft.com/office/drawing/2014/main" id="{7BA9E859-BC29-00D1-9D43-15B67CE149D2}"/>
               </a:ext>
             </a:extLst>
           </p:cNvPr>
@@ -5122,8 +5122,8 @@
         </p:blipFill>
         <p:spPr>
           <a:xfrm>
-            <a:off x="7361219" y="2452570"/>
-            <a:ext cx="3149600" cy="1765300"/>
+            <a:off x="7478806" y="2533650"/>
+            <a:ext cx="3124200" cy="1790700"/>
           </a:xfrm>
           <a:prstGeom prst="rect">
             <a:avLst/>
@@ -5534,36 +5534,6 @@
           <a:xfrm>
             <a:off x="7946315" y="398033"/>
             <a:ext cx="3674913" cy="1401329"/>
-          </a:xfrm>
-          <a:prstGeom prst="rect">
-            <a:avLst/>
-          </a:prstGeom>
-        </p:spPr>
-      </p:pic>
-      <p:pic>
-        <p:nvPicPr>
-          <p:cNvPr id="8" name="Picture 7">
-            <a:extLst>
-              <a:ext uri="{FF2B5EF4-FFF2-40B4-BE49-F238E27FC236}">
-                <a16:creationId xmlns:a16="http://schemas.microsoft.com/office/drawing/2014/main" id="{507C0FEA-4DB9-3B29-E821-6F9C756941E2}"/>
-              </a:ext>
-            </a:extLst>
-          </p:cNvPr>
-          <p:cNvPicPr>
-            <a:picLocks noChangeAspect="1"/>
-          </p:cNvPicPr>
-          <p:nvPr/>
-        </p:nvPicPr>
-        <p:blipFill>
-          <a:blip r:embed="rId4"/>
-          <a:stretch>
-            <a:fillRect/>
-          </a:stretch>
-        </p:blipFill>
-        <p:spPr>
-          <a:xfrm>
-            <a:off x="7976123" y="1796673"/>
-            <a:ext cx="3734832" cy="2489888"/>
           </a:xfrm>
           <a:prstGeom prst="rect">
             <a:avLst/>
@@ -6686,7 +6656,7 @@
           <p:nvPr/>
         </p:nvPicPr>
         <p:blipFill>
-          <a:blip r:embed="rId5"/>
+          <a:blip r:embed="rId4"/>
           <a:stretch>
             <a:fillRect/>
           </a:stretch>
@@ -6736,6 +6706,36 @@
           </a:p>
         </p:txBody>
       </p:sp>
+      <p:pic>
+        <p:nvPicPr>
+          <p:cNvPr id="21" name="Picture 20">
+            <a:extLst>
+              <a:ext uri="{FF2B5EF4-FFF2-40B4-BE49-F238E27FC236}">
+                <a16:creationId xmlns:a16="http://schemas.microsoft.com/office/drawing/2014/main" id="{03583EE6-18D8-0811-8739-9518D975AFC6}"/>
+              </a:ext>
+            </a:extLst>
+          </p:cNvPr>
+          <p:cNvPicPr>
+            <a:picLocks noChangeAspect="1"/>
+          </p:cNvPicPr>
+          <p:nvPr/>
+        </p:nvPicPr>
+        <p:blipFill>
+          <a:blip r:embed="rId5"/>
+          <a:stretch>
+            <a:fillRect/>
+          </a:stretch>
+        </p:blipFill>
+        <p:spPr>
+          <a:xfrm>
+            <a:off x="7892009" y="1612159"/>
+            <a:ext cx="3783523" cy="2522349"/>
+          </a:xfrm>
+          <a:prstGeom prst="rect">
+            <a:avLst/>
+          </a:prstGeom>
+        </p:spPr>
+      </p:pic>
     </p:spTree>
     <p:extLst>
       <p:ext uri="{BB962C8B-B14F-4D97-AF65-F5344CB8AC3E}">

</xml_diff>